<commit_message>
correction to stellar horizons op
</commit_message>
<xml_diff>
--- a/Stellar Horizons SoP/Stellar Horizons Operations.pptx
+++ b/Stellar Horizons SoP/Stellar Horizons Operations.pptx
@@ -200,7 +200,7 @@
           <a:p>
             <a:fld id="{C1B87C5B-8331-6742-A7E3-DC5C24D95CA3}" type="datetimeFigureOut">
               <a:rPr lang="en-IT" smtClean="0"/>
-              <a:t>17/12/24</a:t>
+              <a:t>18/12/24</a:t>
             </a:fld>
             <a:endParaRPr lang="en-IT"/>
           </a:p>
@@ -1051,7 +1051,7 @@
           <a:p>
             <a:fld id="{0E4F425A-E00F-4AAE-A11C-B8D799E92BCC}" type="datetimeFigureOut">
               <a:rPr lang="en-US" smtClean="0"/>
-              <a:t>12/17/24</a:t>
+              <a:t>12/18/24</a:t>
             </a:fld>
             <a:endParaRPr lang="en-US"/>
           </a:p>
@@ -1221,7 +1221,7 @@
           <a:p>
             <a:fld id="{0E4F425A-E00F-4AAE-A11C-B8D799E92BCC}" type="datetimeFigureOut">
               <a:rPr lang="en-US" smtClean="0"/>
-              <a:t>12/17/24</a:t>
+              <a:t>12/18/24</a:t>
             </a:fld>
             <a:endParaRPr lang="en-US"/>
           </a:p>
@@ -1401,7 +1401,7 @@
           <a:p>
             <a:fld id="{0E4F425A-E00F-4AAE-A11C-B8D799E92BCC}" type="datetimeFigureOut">
               <a:rPr lang="en-US" smtClean="0"/>
-              <a:t>12/17/24</a:t>
+              <a:t>12/18/24</a:t>
             </a:fld>
             <a:endParaRPr lang="en-US"/>
           </a:p>
@@ -1571,7 +1571,7 @@
           <a:p>
             <a:fld id="{0E4F425A-E00F-4AAE-A11C-B8D799E92BCC}" type="datetimeFigureOut">
               <a:rPr lang="en-US" smtClean="0"/>
-              <a:t>12/17/24</a:t>
+              <a:t>12/18/24</a:t>
             </a:fld>
             <a:endParaRPr lang="en-US"/>
           </a:p>
@@ -1815,7 +1815,7 @@
           <a:p>
             <a:fld id="{0E4F425A-E00F-4AAE-A11C-B8D799E92BCC}" type="datetimeFigureOut">
               <a:rPr lang="en-US" smtClean="0"/>
-              <a:t>12/17/24</a:t>
+              <a:t>12/18/24</a:t>
             </a:fld>
             <a:endParaRPr lang="en-US"/>
           </a:p>
@@ -2047,7 +2047,7 @@
           <a:p>
             <a:fld id="{0E4F425A-E00F-4AAE-A11C-B8D799E92BCC}" type="datetimeFigureOut">
               <a:rPr lang="en-US" smtClean="0"/>
-              <a:t>12/17/24</a:t>
+              <a:t>12/18/24</a:t>
             </a:fld>
             <a:endParaRPr lang="en-US"/>
           </a:p>
@@ -2414,7 +2414,7 @@
           <a:p>
             <a:fld id="{0E4F425A-E00F-4AAE-A11C-B8D799E92BCC}" type="datetimeFigureOut">
               <a:rPr lang="en-US" smtClean="0"/>
-              <a:t>12/17/24</a:t>
+              <a:t>12/18/24</a:t>
             </a:fld>
             <a:endParaRPr lang="en-US"/>
           </a:p>
@@ -2532,7 +2532,7 @@
           <a:p>
             <a:fld id="{0E4F425A-E00F-4AAE-A11C-B8D799E92BCC}" type="datetimeFigureOut">
               <a:rPr lang="en-US" smtClean="0"/>
-              <a:t>12/17/24</a:t>
+              <a:t>12/18/24</a:t>
             </a:fld>
             <a:endParaRPr lang="en-US"/>
           </a:p>
@@ -2627,7 +2627,7 @@
           <a:p>
             <a:fld id="{0E4F425A-E00F-4AAE-A11C-B8D799E92BCC}" type="datetimeFigureOut">
               <a:rPr lang="en-US" smtClean="0"/>
-              <a:t>12/17/24</a:t>
+              <a:t>12/18/24</a:t>
             </a:fld>
             <a:endParaRPr lang="en-US"/>
           </a:p>
@@ -2904,7 +2904,7 @@
           <a:p>
             <a:fld id="{0E4F425A-E00F-4AAE-A11C-B8D799E92BCC}" type="datetimeFigureOut">
               <a:rPr lang="en-US" smtClean="0"/>
-              <a:t>12/17/24</a:t>
+              <a:t>12/18/24</a:t>
             </a:fld>
             <a:endParaRPr lang="en-US"/>
           </a:p>
@@ -3161,7 +3161,7 @@
           <a:p>
             <a:fld id="{0E4F425A-E00F-4AAE-A11C-B8D799E92BCC}" type="datetimeFigureOut">
               <a:rPr lang="en-US" smtClean="0"/>
-              <a:t>12/17/24</a:t>
+              <a:t>12/18/24</a:t>
             </a:fld>
             <a:endParaRPr lang="en-US"/>
           </a:p>
@@ -3374,7 +3374,7 @@
           <a:p>
             <a:fld id="{0E4F425A-E00F-4AAE-A11C-B8D799E92BCC}" type="datetimeFigureOut">
               <a:rPr lang="en-US" smtClean="0"/>
-              <a:t>12/17/24</a:t>
+              <a:t>12/18/24</a:t>
             </a:fld>
             <a:endParaRPr lang="en-US"/>
           </a:p>
@@ -8556,7 +8556,7 @@
         </p:nvGrpSpPr>
         <p:grpSpPr>
           <a:xfrm>
-            <a:off x="0" y="-5986"/>
+            <a:off x="0" y="1428646"/>
             <a:ext cx="6858000" cy="364001"/>
             <a:chOff x="-285752" y="-5986"/>
             <a:chExt cx="7429500" cy="374376"/>
@@ -8668,7 +8668,7 @@
         </p:nvSpPr>
         <p:spPr>
           <a:xfrm>
-            <a:off x="0" y="350064"/>
+            <a:off x="0" y="1777139"/>
             <a:ext cx="6858000" cy="2446824"/>
           </a:xfrm>
           <a:prstGeom prst="rect">
@@ -8864,7 +8864,7 @@
         </p:nvGrpSpPr>
         <p:grpSpPr>
           <a:xfrm>
-            <a:off x="0" y="2970937"/>
+            <a:off x="0" y="4225244"/>
             <a:ext cx="6858000" cy="364001"/>
             <a:chOff x="-285752" y="-5986"/>
             <a:chExt cx="7429500" cy="374376"/>
@@ -8976,8 +8976,8 @@
         </p:nvSpPr>
         <p:spPr>
           <a:xfrm>
-            <a:off x="-27801" y="3371057"/>
-            <a:ext cx="6858000" cy="6047809"/>
+            <a:off x="-27801" y="4557351"/>
+            <a:ext cx="6858000" cy="5493812"/>
           </a:xfrm>
           <a:prstGeom prst="rect">
             <a:avLst/>
@@ -9059,95 +9059,11 @@
                   <a:srgbClr val="000000"/>
                 </a:solidFill>
               </a:rPr>
-              <a:t>Spend politics markers to:</a:t>
-            </a:r>
-          </a:p>
-          <a:p>
-            <a:pPr marL="325031" lvl="1" indent="-139299">
-              <a:buFont typeface="Arial" panose="020B0604020202020204" pitchFamily="34" charset="0"/>
-              <a:buChar char="•"/>
-            </a:pPr>
-            <a:r>
-              <a:rPr lang="en-GB" sz="900" dirty="0">
-                <a:solidFill>
-                  <a:srgbClr val="000000"/>
-                </a:solidFill>
-              </a:rPr>
-              <a:t>Modify initiative rolls by +10% per marker</a:t>
-            </a:r>
-          </a:p>
-          <a:p>
-            <a:pPr marL="325031" lvl="1" indent="-139299">
-              <a:buFont typeface="Arial" panose="020B0604020202020204" pitchFamily="34" charset="0"/>
-              <a:buChar char="•"/>
-            </a:pPr>
-            <a:r>
-              <a:rPr lang="en-GB" sz="900" dirty="0">
-                <a:solidFill>
-                  <a:srgbClr val="000000"/>
-                </a:solidFill>
-              </a:rPr>
-              <a:t>Add 2 tech points of any type to your tech bank</a:t>
-            </a:r>
-          </a:p>
-          <a:p>
-            <a:pPr marL="325031" lvl="1" indent="-139299">
-              <a:buFont typeface="Arial" panose="020B0604020202020204" pitchFamily="34" charset="0"/>
-              <a:buChar char="•"/>
-            </a:pPr>
-            <a:r>
-              <a:rPr lang="en-GB" sz="900" dirty="0">
-                <a:solidFill>
-                  <a:srgbClr val="000000"/>
-                </a:solidFill>
-              </a:rPr>
-              <a:t>Convert to $1B at any time</a:t>
-            </a:r>
-          </a:p>
-          <a:p>
-            <a:pPr marL="325031" lvl="1" indent="-139299">
-              <a:buFont typeface="Arial" panose="020B0604020202020204" pitchFamily="34" charset="0"/>
-              <a:buChar char="•"/>
-            </a:pPr>
-            <a:r>
-              <a:rPr lang="en-GB" sz="900" dirty="0">
-                <a:solidFill>
-                  <a:srgbClr val="000000"/>
-                </a:solidFill>
-              </a:rPr>
-              <a:t>Spend 2 markers to return an unused mission and re‐draw</a:t>
-            </a:r>
-          </a:p>
-          <a:p>
-            <a:pPr marL="325031" lvl="1" indent="-139299">
-              <a:buFont typeface="Arial" panose="020B0604020202020204" pitchFamily="34" charset="0"/>
-              <a:buChar char="•"/>
-            </a:pPr>
-            <a:r>
-              <a:rPr lang="en-GB" sz="900" dirty="0">
-                <a:solidFill>
-                  <a:srgbClr val="000000"/>
-                </a:solidFill>
-              </a:rPr>
-              <a:t>Spend 4 markers to buy a victory marker</a:t>
-            </a:r>
-          </a:p>
-          <a:p>
-            <a:pPr marL="325031" lvl="1" indent="-139299">
-              <a:buFont typeface="Arial" panose="020B0604020202020204" pitchFamily="34" charset="0"/>
-              <a:buChar char="•"/>
-            </a:pPr>
-            <a:r>
-              <a:rPr lang="en-GB" sz="900" dirty="0">
-                <a:solidFill>
-                  <a:srgbClr val="000000"/>
-                </a:solidFill>
-              </a:rPr>
-              <a:t>Attempt to increase or decrease your foreign relations with another faction</a:t>
-            </a:r>
-          </a:p>
-          <a:p>
-            <a:pPr marL="325031" lvl="1" indent="-139299">
+              <a:t>Spend politics markers to: (1) Modify initiative rolls by +10% per marker, (2) Add 2 tech points of any type to your tech bank, (3) Convert to $1B at any time, (4) Spend 2 markers to return an unused mission and re‐draw, (5) Spend 4 markers to buy a victory marker, (6) Attempt to increase or decrease your foreign relations with another faction</a:t>
+            </a:r>
+          </a:p>
+          <a:p>
+            <a:pPr marL="139299" indent="-139299">
               <a:buFont typeface="Arial" panose="020B0604020202020204" pitchFamily="34" charset="0"/>
               <a:buChar char="•"/>
             </a:pPr>
@@ -9366,7 +9282,7 @@
                   <a:srgbClr val="000000"/>
                 </a:solidFill>
               </a:rPr>
-              <a:t>You can always choose to reserve a ship</a:t>
+              <a:t>You can always choose to reserve a ship. A reserved CV can only move, transfer resources or defend</a:t>
             </a:r>
           </a:p>
           <a:p>
@@ -9381,20 +9297,6 @@
                 </a:solidFill>
               </a:rPr>
               <a:t>You can purchase a ship reserved. The cost is reduced by 1 SUP and 1 FUEL</a:t>
-            </a:r>
-          </a:p>
-          <a:p>
-            <a:pPr marL="139299" indent="-139299">
-              <a:buFont typeface="Arial" panose="020B0604020202020204" pitchFamily="34" charset="0"/>
-              <a:buChar char="•"/>
-            </a:pPr>
-            <a:r>
-              <a:rPr lang="en-GB" sz="900" dirty="0">
-                <a:solidFill>
-                  <a:srgbClr val="000000"/>
-                </a:solidFill>
-              </a:rPr>
-              <a:t>A reserved CV can only move, transfer resources or defend.</a:t>
             </a:r>
           </a:p>
           <a:p>
@@ -9517,6 +9419,283 @@
                 </a:solidFill>
               </a:rPr>
               <a:t>Remove damage by spending 1 ORE. Ships must be at a supply station or spaceport.</a:t>
+            </a:r>
+          </a:p>
+        </p:txBody>
+      </p:sp>
+      <p:grpSp>
+        <p:nvGrpSpPr>
+          <p:cNvPr id="8" name="Group 7">
+            <a:extLst>
+              <a:ext uri="{FF2B5EF4-FFF2-40B4-BE49-F238E27FC236}">
+                <a16:creationId xmlns:a16="http://schemas.microsoft.com/office/drawing/2014/main" id="{E3868C04-3414-C3CC-2B7A-5737D2043B18}"/>
+              </a:ext>
+            </a:extLst>
+          </p:cNvPr>
+          <p:cNvGrpSpPr/>
+          <p:nvPr/>
+        </p:nvGrpSpPr>
+        <p:grpSpPr>
+          <a:xfrm>
+            <a:off x="0" y="0"/>
+            <a:ext cx="6858000" cy="364001"/>
+            <a:chOff x="-285752" y="-5986"/>
+            <a:chExt cx="7429500" cy="374376"/>
+          </a:xfrm>
+        </p:grpSpPr>
+        <p:sp>
+          <p:nvSpPr>
+            <p:cNvPr id="9" name="Rectangle 8">
+              <a:extLst>
+                <a:ext uri="{FF2B5EF4-FFF2-40B4-BE49-F238E27FC236}">
+                  <a16:creationId xmlns:a16="http://schemas.microsoft.com/office/drawing/2014/main" id="{928F3CD5-D562-291C-7F28-6587E3961DC2}"/>
+                </a:ext>
+              </a:extLst>
+            </p:cNvPr>
+            <p:cNvSpPr/>
+            <p:nvPr/>
+          </p:nvSpPr>
+          <p:spPr>
+            <a:xfrm>
+              <a:off x="-285752" y="-5986"/>
+              <a:ext cx="7429500" cy="374376"/>
+            </a:xfrm>
+            <a:prstGeom prst="rect">
+              <a:avLst/>
+            </a:prstGeom>
+            <a:solidFill>
+              <a:schemeClr val="accent1">
+                <a:lumMod val="40000"/>
+                <a:lumOff val="60000"/>
+              </a:schemeClr>
+            </a:solidFill>
+            <a:ln>
+              <a:noFill/>
+            </a:ln>
+          </p:spPr>
+          <p:style>
+            <a:lnRef idx="2">
+              <a:schemeClr val="accent1">
+                <a:shade val="50000"/>
+              </a:schemeClr>
+            </a:lnRef>
+            <a:fillRef idx="1">
+              <a:schemeClr val="accent1"/>
+            </a:fillRef>
+            <a:effectRef idx="0">
+              <a:schemeClr val="accent1"/>
+            </a:effectRef>
+            <a:fontRef idx="minor">
+              <a:schemeClr val="lt1"/>
+            </a:fontRef>
+          </p:style>
+          <p:txBody>
+            <a:bodyPr rtlCol="0" anchor="ctr"/>
+            <a:lstStyle/>
+            <a:p>
+              <a:pPr algn="ctr"/>
+              <a:endParaRPr lang="en-US" sz="1462"/>
+            </a:p>
+          </p:txBody>
+        </p:sp>
+        <p:sp>
+          <p:nvSpPr>
+            <p:cNvPr id="10" name="TextBox 9">
+              <a:extLst>
+                <a:ext uri="{FF2B5EF4-FFF2-40B4-BE49-F238E27FC236}">
+                  <a16:creationId xmlns:a16="http://schemas.microsoft.com/office/drawing/2014/main" id="{DA5D79D9-CC8D-BD51-F058-5429832CDB0B}"/>
+                </a:ext>
+              </a:extLst>
+            </p:cNvPr>
+            <p:cNvSpPr txBox="1"/>
+            <p:nvPr/>
+          </p:nvSpPr>
+          <p:spPr>
+            <a:xfrm>
+              <a:off x="-285748" y="31162"/>
+              <a:ext cx="7369257" cy="326376"/>
+            </a:xfrm>
+            <a:prstGeom prst="rect">
+              <a:avLst/>
+            </a:prstGeom>
+            <a:noFill/>
+          </p:spPr>
+          <p:txBody>
+            <a:bodyPr wrap="square" rtlCol="0">
+              <a:spAutoFit/>
+            </a:bodyPr>
+            <a:lstStyle/>
+            <a:p>
+              <a:pPr algn="ctr"/>
+              <a:r>
+                <a:rPr lang="en-US" sz="1462" b="1" dirty="0"/>
+                <a:t>CV Resource Production</a:t>
+              </a:r>
+            </a:p>
+          </p:txBody>
+        </p:sp>
+      </p:grpSp>
+      <p:sp>
+        <p:nvSpPr>
+          <p:cNvPr id="11" name="TextBox 10">
+            <a:extLst>
+              <a:ext uri="{FF2B5EF4-FFF2-40B4-BE49-F238E27FC236}">
+                <a16:creationId xmlns:a16="http://schemas.microsoft.com/office/drawing/2014/main" id="{8515CDCC-013F-C763-7D38-A309604E6220}"/>
+              </a:ext>
+            </a:extLst>
+          </p:cNvPr>
+          <p:cNvSpPr txBox="1"/>
+          <p:nvPr/>
+        </p:nvSpPr>
+        <p:spPr>
+          <a:xfrm>
+            <a:off x="-4" y="354562"/>
+            <a:ext cx="6858000" cy="1061829"/>
+          </a:xfrm>
+          <a:prstGeom prst="rect">
+            <a:avLst/>
+          </a:prstGeom>
+          <a:noFill/>
+        </p:spPr>
+        <p:txBody>
+          <a:bodyPr wrap="square" rtlCol="0">
+            <a:spAutoFit/>
+          </a:bodyPr>
+          <a:lstStyle/>
+          <a:p>
+            <a:pPr marL="139299" indent="-139299">
+              <a:buFont typeface="Arial" panose="020B0604020202020204" pitchFamily="34" charset="0"/>
+              <a:buChar char="•"/>
+            </a:pPr>
+            <a:r>
+              <a:rPr lang="en-GB" sz="900" dirty="0">
+                <a:solidFill>
+                  <a:srgbClr val="000000"/>
+                </a:solidFill>
+              </a:rPr>
+              <a:t>The </a:t>
+            </a:r>
+            <a:r>
+              <a:rPr lang="en-GB" sz="900" i="1" dirty="0">
+                <a:solidFill>
+                  <a:srgbClr val="000000"/>
+                </a:solidFill>
+              </a:rPr>
+              <a:t>Space Mining </a:t>
+            </a:r>
+            <a:r>
+              <a:rPr lang="en-GB" sz="900" dirty="0">
+                <a:solidFill>
+                  <a:srgbClr val="000000"/>
+                </a:solidFill>
+              </a:rPr>
+              <a:t>tech allows you to produce resources using CVs equipped for production if the world has a world card. And the world must have at least 1 production value for the resource type. You can not use a CV to produce where you have a base. Other bases are ok</a:t>
+            </a:r>
+          </a:p>
+          <a:p>
+            <a:pPr marL="139299" indent="-139299">
+              <a:buFont typeface="Arial" panose="020B0604020202020204" pitchFamily="34" charset="0"/>
+              <a:buChar char="•"/>
+            </a:pPr>
+            <a:r>
+              <a:rPr lang="en-GB" sz="900" dirty="0">
+                <a:solidFill>
+                  <a:srgbClr val="000000"/>
+                </a:solidFill>
+              </a:rPr>
+              <a:t>You </a:t>
+            </a:r>
+            <a:r>
+              <a:rPr lang="en-GB" sz="900" b="1" dirty="0">
+                <a:solidFill>
+                  <a:srgbClr val="000000"/>
+                </a:solidFill>
+              </a:rPr>
+              <a:t>gain 1</a:t>
+            </a:r>
+            <a:r>
+              <a:rPr lang="en-GB" sz="900" dirty="0">
+                <a:solidFill>
+                  <a:srgbClr val="000000"/>
+                </a:solidFill>
+              </a:rPr>
+              <a:t> of the resource you choose. Roll 1d10, modified by the </a:t>
+            </a:r>
+            <a:r>
+              <a:rPr lang="en-GB" sz="900" i="1" dirty="0">
+                <a:solidFill>
+                  <a:srgbClr val="000000"/>
+                </a:solidFill>
+              </a:rPr>
+              <a:t>Space Refining </a:t>
+            </a:r>
+            <a:r>
+              <a:rPr lang="en-GB" sz="900" dirty="0">
+                <a:solidFill>
+                  <a:srgbClr val="000000"/>
+                </a:solidFill>
+              </a:rPr>
+              <a:t>tech. If it is equal or less than the production value of the world, you gain an </a:t>
+            </a:r>
+            <a:r>
+              <a:rPr lang="en-GB" sz="900" b="1" dirty="0">
+                <a:solidFill>
+                  <a:srgbClr val="000000"/>
+                </a:solidFill>
+              </a:rPr>
+              <a:t>extra resource</a:t>
+            </a:r>
+            <a:r>
+              <a:rPr lang="en-GB" sz="900" dirty="0">
+                <a:solidFill>
+                  <a:srgbClr val="000000"/>
+                </a:solidFill>
+              </a:rPr>
+              <a:t>. If the modified roll is 1 or 0, gain </a:t>
+            </a:r>
+            <a:r>
+              <a:rPr lang="en-GB" sz="900" b="1" dirty="0">
+                <a:solidFill>
+                  <a:srgbClr val="000000"/>
+                </a:solidFill>
+              </a:rPr>
+              <a:t>another resource</a:t>
+            </a:r>
+            <a:r>
+              <a:rPr lang="en-GB" sz="900" dirty="0">
+                <a:solidFill>
+                  <a:srgbClr val="000000"/>
+                </a:solidFill>
+              </a:rPr>
+              <a:t>. You can only take what you can store on your fleet</a:t>
+            </a:r>
+          </a:p>
+          <a:p>
+            <a:pPr marL="139299" indent="-139299">
+              <a:buFont typeface="Arial" panose="020B0604020202020204" pitchFamily="34" charset="0"/>
+              <a:buChar char="•"/>
+            </a:pPr>
+            <a:r>
+              <a:rPr lang="en-GB" sz="900" dirty="0">
+                <a:solidFill>
+                  <a:srgbClr val="000000"/>
+                </a:solidFill>
+              </a:rPr>
+              <a:t>Roll for recall after production</a:t>
+            </a:r>
+          </a:p>
+          <a:p>
+            <a:pPr marL="139299" indent="-139299">
+              <a:buFont typeface="Arial" panose="020B0604020202020204" pitchFamily="34" charset="0"/>
+              <a:buChar char="•"/>
+            </a:pPr>
+            <a:r>
+              <a:rPr lang="en-GB" sz="900" dirty="0">
+                <a:solidFill>
+                  <a:srgbClr val="000000"/>
+                </a:solidFill>
+              </a:rPr>
+              <a:t>You can harvest an asteroid marker in a Flyby box. Check the Asteroid Harvest table for the result. Earn a victory marker for each asteroid you harvest.</a:t>
             </a:r>
           </a:p>
         </p:txBody>

</xml_diff>